<commit_message>
Update Web Services demo
</commit_message>
<xml_diff>
--- a/Slides/Telerik Testing Framework/Telerik Testing Framework.pptx
+++ b/Slides/Telerik Testing Framework/Telerik Testing Framework.pptx
@@ -217,7 +217,7 @@
           <a:p>
             <a:fld id="{644303E9-1A8A-406D-9DFA-FF87524EDF5C}" type="datetimeFigureOut">
               <a:rPr lang="en-US" smtClean="0"/>
-              <a:t>10/6/2014</a:t>
+              <a:t>11/10/2014</a:t>
             </a:fld>
             <a:endParaRPr lang="en-US"/>
           </a:p>
@@ -9284,11 +9284,7 @@
             </a:pPr>
             <a:r>
               <a:rPr lang="en-US" sz="2900" dirty="0" smtClean="0"/>
-              <a:t>Browser </a:t>
-            </a:r>
-            <a:r>
-              <a:rPr lang="en-US" sz="2900" dirty="0" smtClean="0"/>
-              <a:t>abstraction</a:t>
+              <a:t>Browser abstraction</a:t>
             </a:r>
           </a:p>
           <a:p>

</xml_diff>